<commit_message>
- Check that all nodes with NrFrequency=old_arfcn also have NrFrequency=new_arfcn. - Check that all NRCellCUId with NrFreqRelation=old_arfcn also have NrFreqRelation=new_arfcn and all params are same (except nRFreqRelationId, nRFrequencyRef and reservedBy). - Check that all nodes with GUtranSyncSignalFrequency=old_arfcn also have GUtranSyncSignalFrequency=new_arfcn. - Check that all EUtranCellFDDId with GUtranFreqRelationId=old_arfcn-30-20-0-1 also have GUtranFreqRelationId=new_arfcn-30-20-0-1 and all params are same (except gUtranFreqRelationId and gUtranSyncSignalFrequencyRef). - Increased up to 100 nodes/slide (max 4 columns) for the Inconsistencies slides in `ConfigurationAudit` module.
</commit_message>
<xml_diff>
--- a/src/ppt_templates/ConfigurationAuditTemplate.pptx
+++ b/src/ppt_templates/ConfigurationAuditTemplate.pptx
@@ -118,6 +118,9 @@
           </p15:clr>
         </p15:guide>
       </p15:sldGuideLst>
+    </p:ext>
+    <p:ext uri="{2D200454-40CA-4A62-9FC3-DE9A4176ACB9}">
+      <p15:notesGuideLst xmlns:p15="http://schemas.microsoft.com/office/powerpoint/2012/main"/>
     </p:ext>
   </p:extLst>
 </p:presentation>
@@ -15048,7 +15051,7 @@
           <a:p>
             <a:fld id="{044512AF-DD4E-4B73-98EF-EA3A4CA19885}" type="datetimeFigureOut">
               <a:rPr lang="en-US" smtClean="0"/>
-              <a:t>11/17/2025</a:t>
+              <a:t>11/20/2025</a:t>
             </a:fld>
             <a:endParaRPr lang="en-US"/>
           </a:p>
@@ -15322,7 +15325,7 @@
           <a:p>
             <a:fld id="{5BCAD085-E8A6-8845-BD4E-CB4CCA059FC4}" type="datetimeFigureOut">
               <a:rPr lang="en-US" smtClean="0"/>
-              <a:t>11/17/2025</a:t>
+              <a:t>11/20/2025</a:t>
             </a:fld>
             <a:endParaRPr lang="en-US"/>
           </a:p>
@@ -15567,7 +15570,7 @@
           <a:p>
             <a:fld id="{5BCAD085-E8A6-8845-BD4E-CB4CCA059FC4}" type="datetimeFigureOut">
               <a:rPr lang="en-US" smtClean="0"/>
-              <a:t>11/17/2025</a:t>
+              <a:t>11/20/2025</a:t>
             </a:fld>
             <a:endParaRPr lang="en-US"/>
           </a:p>
@@ -15852,7 +15855,7 @@
           <a:p>
             <a:fld id="{5BCAD085-E8A6-8845-BD4E-CB4CCA059FC4}" type="datetimeFigureOut">
               <a:rPr lang="en-US" smtClean="0"/>
-              <a:t>11/17/2025</a:t>
+              <a:t>11/20/2025</a:t>
             </a:fld>
             <a:endParaRPr lang="en-US"/>
           </a:p>
@@ -16271,7 +16274,7 @@
           <a:p>
             <a:fld id="{5BCAD085-E8A6-8845-BD4E-CB4CCA059FC4}" type="datetimeFigureOut">
               <a:rPr lang="en-US" smtClean="0"/>
-              <a:t>11/17/2025</a:t>
+              <a:t>11/20/2025</a:t>
             </a:fld>
             <a:endParaRPr lang="en-US"/>
           </a:p>
@@ -16388,7 +16391,7 @@
           <a:p>
             <a:fld id="{5BCAD085-E8A6-8845-BD4E-CB4CCA059FC4}" type="datetimeFigureOut">
               <a:rPr lang="en-US" smtClean="0"/>
-              <a:t>11/17/2025</a:t>
+              <a:t>11/20/2025</a:t>
             </a:fld>
             <a:endParaRPr lang="en-US"/>
           </a:p>
@@ -16483,7 +16486,7 @@
           <a:p>
             <a:fld id="{5BCAD085-E8A6-8845-BD4E-CB4CCA059FC4}" type="datetimeFigureOut">
               <a:rPr lang="en-US" smtClean="0"/>
-              <a:t>11/17/2025</a:t>
+              <a:t>11/20/2025</a:t>
             </a:fld>
             <a:endParaRPr lang="en-US"/>
           </a:p>
@@ -16758,7 +16761,7 @@
           <a:p>
             <a:fld id="{5BCAD085-E8A6-8845-BD4E-CB4CCA059FC4}" type="datetimeFigureOut">
               <a:rPr lang="en-US" smtClean="0"/>
-              <a:t>11/17/2025</a:t>
+              <a:t>11/20/2025</a:t>
             </a:fld>
             <a:endParaRPr lang="en-US"/>
           </a:p>
@@ -17010,7 +17013,7 @@
           <a:p>
             <a:fld id="{5BCAD085-E8A6-8845-BD4E-CB4CCA059FC4}" type="datetimeFigureOut">
               <a:rPr lang="en-US" smtClean="0"/>
-              <a:t>11/17/2025</a:t>
+              <a:t>11/20/2025</a:t>
             </a:fld>
             <a:endParaRPr lang="en-US"/>
           </a:p>
@@ -17178,7 +17181,7 @@
           <a:p>
             <a:fld id="{5BCAD085-E8A6-8845-BD4E-CB4CCA059FC4}" type="datetimeFigureOut">
               <a:rPr lang="en-US" smtClean="0"/>
-              <a:t>11/17/2025</a:t>
+              <a:t>11/20/2025</a:t>
             </a:fld>
             <a:endParaRPr lang="en-US"/>
           </a:p>
@@ -17356,7 +17359,7 @@
           <a:p>
             <a:fld id="{5BCAD085-E8A6-8845-BD4E-CB4CCA059FC4}" type="datetimeFigureOut">
               <a:rPr lang="en-US" smtClean="0"/>
-              <a:t>11/17/2025</a:t>
+              <a:t>11/20/2025</a:t>
             </a:fld>
             <a:endParaRPr lang="en-US"/>
           </a:p>
@@ -17418,182 +17421,6 @@
 </file>
 
 <file path=ppt/slideLayouts/slideLayout2.xml><?xml version="1.0" encoding="utf-8"?>
-<p:sldLayout xmlns:a="http://schemas.openxmlformats.org/drawingml/2006/main" xmlns:r="http://schemas.openxmlformats.org/officeDocument/2006/relationships" xmlns:p="http://schemas.openxmlformats.org/presentationml/2006/main" type="obj" preserve="1">
-  <p:cSld name="1_Title and Content">
-    <p:bg>
-      <p:bgPr>
-        <a:solidFill>
-          <a:schemeClr val="bg1"/>
-        </a:solidFill>
-        <a:effectLst/>
-      </p:bgPr>
-    </p:bg>
-    <p:spTree>
-      <p:nvGrpSpPr>
-        <p:cNvPr id="1" name=""/>
-        <p:cNvGrpSpPr/>
-        <p:nvPr/>
-      </p:nvGrpSpPr>
-      <p:grpSpPr>
-        <a:xfrm>
-          <a:off x="0" y="0"/>
-          <a:ext cx="0" cy="0"/>
-          <a:chOff x="0" y="0"/>
-          <a:chExt cx="0" cy="0"/>
-        </a:xfrm>
-      </p:grpSpPr>
-      <p:sp>
-        <p:nvSpPr>
-          <p:cNvPr id="2" name="Title 1"/>
-          <p:cNvSpPr>
-            <a:spLocks noGrp="1"/>
-          </p:cNvSpPr>
-          <p:nvPr>
-            <p:ph type="title"/>
-          </p:nvPr>
-        </p:nvSpPr>
-        <p:spPr/>
-        <p:txBody>
-          <a:bodyPr/>
-          <a:lstStyle/>
-          <a:p>
-            <a:r>
-              <a:rPr lang="en-US"/>
-              <a:t>Click to edit Master title style</a:t>
-            </a:r>
-          </a:p>
-        </p:txBody>
-      </p:sp>
-      <p:sp>
-        <p:nvSpPr>
-          <p:cNvPr id="3" name="Content Placeholder 2"/>
-          <p:cNvSpPr>
-            <a:spLocks noGrp="1"/>
-          </p:cNvSpPr>
-          <p:nvPr>
-            <p:ph idx="1"/>
-          </p:nvPr>
-        </p:nvSpPr>
-        <p:spPr/>
-        <p:txBody>
-          <a:bodyPr/>
-          <a:lstStyle/>
-          <a:p>
-            <a:pPr lvl="0"/>
-            <a:r>
-              <a:rPr lang="en-US"/>
-              <a:t>Click to edit Master text styles</a:t>
-            </a:r>
-          </a:p>
-          <a:p>
-            <a:pPr lvl="1"/>
-            <a:r>
-              <a:rPr lang="en-US"/>
-              <a:t>Second level</a:t>
-            </a:r>
-          </a:p>
-          <a:p>
-            <a:pPr lvl="2"/>
-            <a:r>
-              <a:rPr lang="en-US"/>
-              <a:t>Third level</a:t>
-            </a:r>
-          </a:p>
-          <a:p>
-            <a:pPr lvl="3"/>
-            <a:r>
-              <a:rPr lang="en-US"/>
-              <a:t>Fourth level</a:t>
-            </a:r>
-          </a:p>
-          <a:p>
-            <a:pPr lvl="4"/>
-            <a:r>
-              <a:rPr lang="en-US"/>
-              <a:t>Fifth level</a:t>
-            </a:r>
-          </a:p>
-        </p:txBody>
-      </p:sp>
-      <p:sp>
-        <p:nvSpPr>
-          <p:cNvPr id="4" name="Date Placeholder 3"/>
-          <p:cNvSpPr>
-            <a:spLocks noGrp="1"/>
-          </p:cNvSpPr>
-          <p:nvPr>
-            <p:ph type="dt" sz="half" idx="10"/>
-          </p:nvPr>
-        </p:nvSpPr>
-        <p:spPr/>
-        <p:txBody>
-          <a:bodyPr/>
-          <a:lstStyle/>
-          <a:p>
-            <a:fld id="{5BCAD085-E8A6-8845-BD4E-CB4CCA059FC4}" type="datetimeFigureOut">
-              <a:rPr lang="en-US" smtClean="0"/>
-              <a:t>11/17/2025</a:t>
-            </a:fld>
-            <a:endParaRPr lang="en-US"/>
-          </a:p>
-        </p:txBody>
-      </p:sp>
-      <p:sp>
-        <p:nvSpPr>
-          <p:cNvPr id="5" name="Footer Placeholder 4"/>
-          <p:cNvSpPr>
-            <a:spLocks noGrp="1"/>
-          </p:cNvSpPr>
-          <p:nvPr>
-            <p:ph type="ftr" sz="quarter" idx="11"/>
-          </p:nvPr>
-        </p:nvSpPr>
-        <p:spPr/>
-        <p:txBody>
-          <a:bodyPr/>
-          <a:lstStyle/>
-          <a:p>
-            <a:endParaRPr lang="en-US"/>
-          </a:p>
-        </p:txBody>
-      </p:sp>
-      <p:sp>
-        <p:nvSpPr>
-          <p:cNvPr id="6" name="Slide Number Placeholder 5"/>
-          <p:cNvSpPr>
-            <a:spLocks noGrp="1"/>
-          </p:cNvSpPr>
-          <p:nvPr>
-            <p:ph type="sldNum" sz="quarter" idx="12"/>
-          </p:nvPr>
-        </p:nvSpPr>
-        <p:spPr/>
-        <p:txBody>
-          <a:bodyPr/>
-          <a:lstStyle/>
-          <a:p>
-            <a:fld id="{C1FF6DA9-008F-8B48-92A6-B652298478BF}" type="slidenum">
-              <a:rPr lang="en-US" smtClean="0"/>
-              <a:t>‹#›</a:t>
-            </a:fld>
-            <a:endParaRPr lang="en-US"/>
-          </a:p>
-        </p:txBody>
-      </p:sp>
-    </p:spTree>
-    <p:extLst>
-      <p:ext uri="{BB962C8B-B14F-4D97-AF65-F5344CB8AC3E}">
-        <p14:creationId xmlns:p14="http://schemas.microsoft.com/office/powerpoint/2010/main" val="3747716504"/>
-      </p:ext>
-    </p:extLst>
-  </p:cSld>
-  <p:clrMapOvr>
-    <a:overrideClrMapping bg1="lt1" tx1="dk1" bg2="lt2" tx2="dk2" accent1="accent1" accent2="accent2" accent3="accent3" accent4="accent4" accent5="accent5" accent6="accent6" hlink="hlink" folHlink="folHlink"/>
-  </p:clrMapOvr>
-</p:sldLayout>
-</file>
-
-<file path=ppt/slideLayouts/slideLayout3.xml><?xml version="1.0" encoding="utf-8"?>
 <p:sldLayout xmlns:a="http://schemas.openxmlformats.org/drawingml/2006/main" xmlns:r="http://schemas.openxmlformats.org/officeDocument/2006/relationships" xmlns:p="http://schemas.openxmlformats.org/presentationml/2006/main" type="obj" preserve="1">
   <p:cSld name="Title and Content">
     <p:bg>
@@ -18252,7 +18079,7 @@
           <a:p>
             <a:fld id="{5BCAD085-E8A6-8845-BD4E-CB4CCA059FC4}" type="datetimeFigureOut">
               <a:rPr lang="en-US" smtClean="0"/>
-              <a:t>11/17/2025</a:t>
+              <a:t>11/20/2025</a:t>
             </a:fld>
             <a:endParaRPr lang="en-US"/>
           </a:p>
@@ -18304,6 +18131,182 @@
     <p:extLst>
       <p:ext uri="{BB962C8B-B14F-4D97-AF65-F5344CB8AC3E}">
         <p14:creationId xmlns:p14="http://schemas.microsoft.com/office/powerpoint/2010/main" val="2614314258"/>
+      </p:ext>
+    </p:extLst>
+  </p:cSld>
+  <p:clrMapOvr>
+    <a:overrideClrMapping bg1="lt1" tx1="dk1" bg2="lt2" tx2="dk2" accent1="accent1" accent2="accent2" accent3="accent3" accent4="accent4" accent5="accent5" accent6="accent6" hlink="hlink" folHlink="folHlink"/>
+  </p:clrMapOvr>
+</p:sldLayout>
+</file>
+
+<file path=ppt/slideLayouts/slideLayout3.xml><?xml version="1.0" encoding="utf-8"?>
+<p:sldLayout xmlns:a="http://schemas.openxmlformats.org/drawingml/2006/main" xmlns:r="http://schemas.openxmlformats.org/officeDocument/2006/relationships" xmlns:p="http://schemas.openxmlformats.org/presentationml/2006/main" type="obj" preserve="1">
+  <p:cSld name="1_Title and Content">
+    <p:bg>
+      <p:bgPr>
+        <a:solidFill>
+          <a:schemeClr val="bg1"/>
+        </a:solidFill>
+        <a:effectLst/>
+      </p:bgPr>
+    </p:bg>
+    <p:spTree>
+      <p:nvGrpSpPr>
+        <p:cNvPr id="1" name=""/>
+        <p:cNvGrpSpPr/>
+        <p:nvPr/>
+      </p:nvGrpSpPr>
+      <p:grpSpPr>
+        <a:xfrm>
+          <a:off x="0" y="0"/>
+          <a:ext cx="0" cy="0"/>
+          <a:chOff x="0" y="0"/>
+          <a:chExt cx="0" cy="0"/>
+        </a:xfrm>
+      </p:grpSpPr>
+      <p:sp>
+        <p:nvSpPr>
+          <p:cNvPr id="2" name="Title 1"/>
+          <p:cNvSpPr>
+            <a:spLocks noGrp="1"/>
+          </p:cNvSpPr>
+          <p:nvPr>
+            <p:ph type="title"/>
+          </p:nvPr>
+        </p:nvSpPr>
+        <p:spPr/>
+        <p:txBody>
+          <a:bodyPr/>
+          <a:lstStyle/>
+          <a:p>
+            <a:r>
+              <a:rPr lang="en-US"/>
+              <a:t>Click to edit Master title style</a:t>
+            </a:r>
+          </a:p>
+        </p:txBody>
+      </p:sp>
+      <p:sp>
+        <p:nvSpPr>
+          <p:cNvPr id="3" name="Content Placeholder 2"/>
+          <p:cNvSpPr>
+            <a:spLocks noGrp="1"/>
+          </p:cNvSpPr>
+          <p:nvPr>
+            <p:ph idx="1"/>
+          </p:nvPr>
+        </p:nvSpPr>
+        <p:spPr/>
+        <p:txBody>
+          <a:bodyPr/>
+          <a:lstStyle/>
+          <a:p>
+            <a:pPr lvl="0"/>
+            <a:r>
+              <a:rPr lang="en-US"/>
+              <a:t>Click to edit Master text styles</a:t>
+            </a:r>
+          </a:p>
+          <a:p>
+            <a:pPr lvl="1"/>
+            <a:r>
+              <a:rPr lang="en-US"/>
+              <a:t>Second level</a:t>
+            </a:r>
+          </a:p>
+          <a:p>
+            <a:pPr lvl="2"/>
+            <a:r>
+              <a:rPr lang="en-US"/>
+              <a:t>Third level</a:t>
+            </a:r>
+          </a:p>
+          <a:p>
+            <a:pPr lvl="3"/>
+            <a:r>
+              <a:rPr lang="en-US"/>
+              <a:t>Fourth level</a:t>
+            </a:r>
+          </a:p>
+          <a:p>
+            <a:pPr lvl="4"/>
+            <a:r>
+              <a:rPr lang="en-US"/>
+              <a:t>Fifth level</a:t>
+            </a:r>
+          </a:p>
+        </p:txBody>
+      </p:sp>
+      <p:sp>
+        <p:nvSpPr>
+          <p:cNvPr id="4" name="Date Placeholder 3"/>
+          <p:cNvSpPr>
+            <a:spLocks noGrp="1"/>
+          </p:cNvSpPr>
+          <p:nvPr>
+            <p:ph type="dt" sz="half" idx="10"/>
+          </p:nvPr>
+        </p:nvSpPr>
+        <p:spPr/>
+        <p:txBody>
+          <a:bodyPr/>
+          <a:lstStyle/>
+          <a:p>
+            <a:fld id="{5BCAD085-E8A6-8845-BD4E-CB4CCA059FC4}" type="datetimeFigureOut">
+              <a:rPr lang="en-US" smtClean="0"/>
+              <a:t>11/20/2025</a:t>
+            </a:fld>
+            <a:endParaRPr lang="en-US"/>
+          </a:p>
+        </p:txBody>
+      </p:sp>
+      <p:sp>
+        <p:nvSpPr>
+          <p:cNvPr id="5" name="Footer Placeholder 4"/>
+          <p:cNvSpPr>
+            <a:spLocks noGrp="1"/>
+          </p:cNvSpPr>
+          <p:nvPr>
+            <p:ph type="ftr" sz="quarter" idx="11"/>
+          </p:nvPr>
+        </p:nvSpPr>
+        <p:spPr/>
+        <p:txBody>
+          <a:bodyPr/>
+          <a:lstStyle/>
+          <a:p>
+            <a:endParaRPr lang="en-US"/>
+          </a:p>
+        </p:txBody>
+      </p:sp>
+      <p:sp>
+        <p:nvSpPr>
+          <p:cNvPr id="6" name="Slide Number Placeholder 5"/>
+          <p:cNvSpPr>
+            <a:spLocks noGrp="1"/>
+          </p:cNvSpPr>
+          <p:nvPr>
+            <p:ph type="sldNum" sz="quarter" idx="12"/>
+          </p:nvPr>
+        </p:nvSpPr>
+        <p:spPr/>
+        <p:txBody>
+          <a:bodyPr/>
+          <a:lstStyle/>
+          <a:p>
+            <a:fld id="{C1FF6DA9-008F-8B48-92A6-B652298478BF}" type="slidenum">
+              <a:rPr lang="en-US" smtClean="0"/>
+              <a:t>‹#›</a:t>
+            </a:fld>
+            <a:endParaRPr lang="en-US"/>
+          </a:p>
+        </p:txBody>
+      </p:sp>
+    </p:spTree>
+    <p:extLst>
+      <p:ext uri="{BB962C8B-B14F-4D97-AF65-F5344CB8AC3E}">
+        <p14:creationId xmlns:p14="http://schemas.microsoft.com/office/powerpoint/2010/main" val="3747716504"/>
       </p:ext>
     </p:extLst>
   </p:cSld>
@@ -18381,7 +18384,7 @@
           <a:p>
             <a:fld id="{5BCAD085-E8A6-8845-BD4E-CB4CCA059FC4}" type="datetimeFigureOut">
               <a:rPr lang="en-US" smtClean="0"/>
-              <a:t>11/17/2025</a:t>
+              <a:t>11/20/2025</a:t>
             </a:fld>
             <a:endParaRPr lang="en-US"/>
           </a:p>
@@ -19239,7 +19242,7 @@
           <a:p>
             <a:fld id="{5BCAD085-E8A6-8845-BD4E-CB4CCA059FC4}" type="datetimeFigureOut">
               <a:rPr lang="en-US" smtClean="0"/>
-              <a:t>11/17/2025</a:t>
+              <a:t>11/20/2025</a:t>
             </a:fld>
             <a:endParaRPr lang="en-US"/>
           </a:p>
@@ -20098,7 +20101,7 @@
           <a:p>
             <a:fld id="{5BCAD085-E8A6-8845-BD4E-CB4CCA059FC4}" type="datetimeFigureOut">
               <a:rPr lang="en-US" smtClean="0"/>
-              <a:t>11/17/2025</a:t>
+              <a:t>11/20/2025</a:t>
             </a:fld>
             <a:endParaRPr lang="en-US"/>
           </a:p>
@@ -21622,7 +21625,7 @@
           <a:p>
             <a:fld id="{5BCAD085-E8A6-8845-BD4E-CB4CCA059FC4}" type="datetimeFigureOut">
               <a:rPr lang="en-US" smtClean="0"/>
-              <a:t>11/17/2025</a:t>
+              <a:t>11/20/2025</a:t>
             </a:fld>
             <a:endParaRPr lang="en-US"/>
           </a:p>
@@ -22480,7 +22483,7 @@
           <a:p>
             <a:fld id="{5BCAD085-E8A6-8845-BD4E-CB4CCA059FC4}" type="datetimeFigureOut">
               <a:rPr lang="en-US" smtClean="0"/>
-              <a:t>11/17/2025</a:t>
+              <a:t>11/20/2025</a:t>
             </a:fld>
             <a:endParaRPr lang="en-US"/>
           </a:p>
@@ -22621,7 +22624,7 @@
           <a:p>
             <a:fld id="{5BCAD085-E8A6-8845-BD4E-CB4CCA059FC4}" type="datetimeFigureOut">
               <a:rPr lang="en-US" smtClean="0"/>
-              <a:t>11/17/2025</a:t>
+              <a:t>11/20/2025</a:t>
             </a:fld>
             <a:endParaRPr lang="en-US"/>
           </a:p>
@@ -22844,7 +22847,7 @@
           <a:p>
             <a:fld id="{5BCAD085-E8A6-8845-BD4E-CB4CCA059FC4}" type="datetimeFigureOut">
               <a:rPr lang="en-US" smtClean="0"/>
-              <a:t>11/17/2025</a:t>
+              <a:t>11/20/2025</a:t>
             </a:fld>
             <a:endParaRPr lang="en-US"/>
           </a:p>
@@ -22938,8 +22941,8 @@
   <p:clrMap bg1="lt1" tx1="dk1" bg2="lt2" tx2="dk2" accent1="accent1" accent2="accent2" accent3="accent3" accent4="accent4" accent5="accent5" accent6="accent6" hlink="hlink" folHlink="folHlink"/>
   <p:sldLayoutIdLst>
     <p:sldLayoutId id="2147483649" r:id="rId1"/>
-    <p:sldLayoutId id="2147483660" r:id="rId2"/>
-    <p:sldLayoutId id="2147483650" r:id="rId3"/>
+    <p:sldLayoutId id="2147483650" r:id="rId2"/>
+    <p:sldLayoutId id="2147483660" r:id="rId3"/>
     <p:sldLayoutId id="2147483661" r:id="rId4"/>
     <p:sldLayoutId id="2147483662" r:id="rId5"/>
     <p:sldLayoutId id="2147483666" r:id="rId6"/>
@@ -24207,6 +24210,12 @@
 </file>
 
 <file path=customXml/item3.xml><?xml version="1.0" encoding="utf-8"?>
+<p:properties xmlns:p="http://schemas.microsoft.com/office/2006/metadata/properties" xmlns:xsi="http://www.w3.org/2001/XMLSchema-instance" xmlns:pc="http://schemas.microsoft.com/office/infopath/2007/PartnerControls">
+  <documentManagement/>
+</p:properties>
+</file>
+
+<file path=customXml/item4.xml><?xml version="1.0" encoding="utf-8"?>
 <?mso-contentType ?>
 <FormTemplates xmlns="http://schemas.microsoft.com/sharepoint/v3/contenttype/forms">
   <Display>DocumentLibraryForm</Display>
@@ -24215,13 +24224,25 @@
 </FormTemplates>
 </file>
 
-<file path=customXml/item4.xml><?xml version="1.0" encoding="utf-8"?>
-<p:properties xmlns:p="http://schemas.microsoft.com/office/2006/metadata/properties" xmlns:xsi="http://www.w3.org/2001/XMLSchema-instance" xmlns:pc="http://schemas.microsoft.com/office/infopath/2007/PartnerControls">
-  <documentManagement/>
-</p:properties>
+<file path=customXml/itemProps1.xml><?xml version="1.0" encoding="utf-8"?>
+<ds:datastoreItem xmlns:ds="http://schemas.openxmlformats.org/officeDocument/2006/customXml" ds:itemID="{10BB2122-50FB-4777-8728-D52F7CF1AED8}">
+  <ds:schemaRefs>
+    <ds:schemaRef ds:uri="4d118d9b-448c-4a54-90d4-6d126d04e28f"/>
+    <ds:schemaRef ds:uri="http://purl.org/dc/elements/1.1/"/>
+    <ds:schemaRef ds:uri="http://purl.org/dc/terms/"/>
+    <ds:schemaRef ds:uri="http://schemas.microsoft.com/internal/obd"/>
+    <ds:schemaRef ds:uri="http://schemas.microsoft.com/office/2006/documentManagement/types"/>
+    <ds:schemaRef ds:uri="http://schemas.microsoft.com/office/2006/metadata/contentType"/>
+    <ds:schemaRef ds:uri="http://schemas.microsoft.com/office/2006/metadata/properties"/>
+    <ds:schemaRef ds:uri="http://schemas.microsoft.com/office/2006/metadata/properties/metaAttributes"/>
+    <ds:schemaRef ds:uri="http://schemas.microsoft.com/office/infopath/2007/PartnerControls"/>
+    <ds:schemaRef ds:uri="http://schemas.openxmlformats.org/package/2006/metadata/core-properties"/>
+    <ds:schemaRef ds:uri="http://www.w3.org/2001/XMLSchema"/>
+  </ds:schemaRefs>
+</ds:datastoreItem>
 </file>
 
-<file path=customXml/itemProps1.xml><?xml version="1.0" encoding="utf-8"?>
+<file path=customXml/itemProps2.xml><?xml version="1.0" encoding="utf-8"?>
 <ds:datastoreItem xmlns:ds="http://schemas.openxmlformats.org/officeDocument/2006/customXml" ds:itemID="{EC3F7911-CA70-450D-9C74-276FAE63B2A1}">
   <ds:schemaRefs>
     <ds:schemaRef ds:uri="4d118d9b-448c-4a54-90d4-6d126d04e28f"/>
@@ -24239,37 +24260,19 @@
 </ds:datastoreItem>
 </file>
 
-<file path=customXml/itemProps2.xml><?xml version="1.0" encoding="utf-8"?>
-<ds:datastoreItem xmlns:ds="http://schemas.openxmlformats.org/officeDocument/2006/customXml" ds:itemID="{10BB2122-50FB-4777-8728-D52F7CF1AED8}">
-  <ds:schemaRefs>
-    <ds:schemaRef ds:uri="4d118d9b-448c-4a54-90d4-6d126d04e28f"/>
-    <ds:schemaRef ds:uri="http://purl.org/dc/elements/1.1/"/>
-    <ds:schemaRef ds:uri="http://purl.org/dc/terms/"/>
-    <ds:schemaRef ds:uri="http://schemas.microsoft.com/internal/obd"/>
-    <ds:schemaRef ds:uri="http://schemas.microsoft.com/office/2006/documentManagement/types"/>
-    <ds:schemaRef ds:uri="http://schemas.microsoft.com/office/2006/metadata/contentType"/>
-    <ds:schemaRef ds:uri="http://schemas.microsoft.com/office/2006/metadata/properties"/>
-    <ds:schemaRef ds:uri="http://schemas.microsoft.com/office/2006/metadata/properties/metaAttributes"/>
-    <ds:schemaRef ds:uri="http://schemas.microsoft.com/office/infopath/2007/PartnerControls"/>
-    <ds:schemaRef ds:uri="http://schemas.openxmlformats.org/package/2006/metadata/core-properties"/>
-    <ds:schemaRef ds:uri="http://www.w3.org/2001/XMLSchema"/>
-  </ds:schemaRefs>
-</ds:datastoreItem>
-</file>
-
 <file path=customXml/itemProps3.xml><?xml version="1.0" encoding="utf-8"?>
-<ds:datastoreItem xmlns:ds="http://schemas.openxmlformats.org/officeDocument/2006/customXml" ds:itemID="{4635B0D5-FB81-4068-AEC4-E15905E3EFEE}">
-  <ds:schemaRefs>
-    <ds:schemaRef ds:uri="http://schemas.microsoft.com/sharepoint/v3/contenttype/forms"/>
-  </ds:schemaRefs>
-</ds:datastoreItem>
-</file>
-
-<file path=customXml/itemProps4.xml><?xml version="1.0" encoding="utf-8"?>
 <ds:datastoreItem xmlns:ds="http://schemas.openxmlformats.org/officeDocument/2006/customXml" ds:itemID="{9D39D6F7-DEC6-43E0-B150-2B295957F91D}">
   <ds:schemaRefs>
     <ds:schemaRef ds:uri="http://schemas.microsoft.com/office/2006/metadata/properties"/>
     <ds:schemaRef ds:uri="http://schemas.microsoft.com/office/infopath/2007/PartnerControls"/>
   </ds:schemaRefs>
 </ds:datastoreItem>
+</file>
+
+<file path=customXml/itemProps4.xml><?xml version="1.0" encoding="utf-8"?>
+<ds:datastoreItem xmlns:ds="http://schemas.openxmlformats.org/officeDocument/2006/customXml" ds:itemID="{4635B0D5-FB81-4068-AEC4-E15905E3EFEE}">
+  <ds:schemaRefs>
+    <ds:schemaRef ds:uri="http://schemas.microsoft.com/sharepoint/v3/contenttype/forms"/>
+  </ds:schemaRefs>
+</ds:datastoreItem>
 </file>
</xml_diff>